<commit_message>
revert intro notebook (#24)
* intro slides

* refactor talks

* Delete part1_introduction.ipynb

* revert notebook

* intro link

* slides

* shapelets etc
</commit_message>
<xml_diff>
--- a/KDD-2024/Slides/part1_Introduction.pptx
+++ b/KDD-2024/Slides/part1_Introduction.pptx
@@ -2766,7 +2766,7 @@
           <a:p>
             <a:fld id="{A208CC58-AEBA-4B81-AD4F-648E402612BD}" type="datetimeFigureOut">
               <a:rPr lang="en-GB" smtClean="0"/>
-              <a:t>16/08/2024</a:t>
+              <a:t>21/08/2024</a:t>
             </a:fld>
             <a:endParaRPr lang="en-GB"/>
           </a:p>
@@ -3436,7 +3436,7 @@
           <a:p>
             <a:fld id="{EDEC158B-FB0A-43FC-87BA-79B801717EB2}" type="datetimeFigureOut">
               <a:rPr lang="en-AU" smtClean="0"/>
-              <a:t>16/08/2024</a:t>
+              <a:t>21/08/2024</a:t>
             </a:fld>
             <a:endParaRPr lang="en-AU"/>
           </a:p>
@@ -3636,7 +3636,7 @@
           <a:p>
             <a:fld id="{EDEC158B-FB0A-43FC-87BA-79B801717EB2}" type="datetimeFigureOut">
               <a:rPr lang="en-AU" smtClean="0"/>
-              <a:t>16/08/2024</a:t>
+              <a:t>21/08/2024</a:t>
             </a:fld>
             <a:endParaRPr lang="en-AU"/>
           </a:p>
@@ -3846,7 +3846,7 @@
           <a:p>
             <a:fld id="{EDEC158B-FB0A-43FC-87BA-79B801717EB2}" type="datetimeFigureOut">
               <a:rPr lang="en-AU" smtClean="0"/>
-              <a:t>16/08/2024</a:t>
+              <a:t>21/08/2024</a:t>
             </a:fld>
             <a:endParaRPr lang="en-AU"/>
           </a:p>
@@ -4880,7 +4880,7 @@
           <a:p>
             <a:fld id="{EDEC158B-FB0A-43FC-87BA-79B801717EB2}" type="datetimeFigureOut">
               <a:rPr lang="en-AU" smtClean="0"/>
-              <a:t>16/08/2024</a:t>
+              <a:t>21/08/2024</a:t>
             </a:fld>
             <a:endParaRPr lang="en-AU"/>
           </a:p>
@@ -5156,7 +5156,7 @@
           <a:p>
             <a:fld id="{EDEC158B-FB0A-43FC-87BA-79B801717EB2}" type="datetimeFigureOut">
               <a:rPr lang="en-AU" smtClean="0"/>
-              <a:t>16/08/2024</a:t>
+              <a:t>21/08/2024</a:t>
             </a:fld>
             <a:endParaRPr lang="en-AU"/>
           </a:p>
@@ -5424,7 +5424,7 @@
           <a:p>
             <a:fld id="{EDEC158B-FB0A-43FC-87BA-79B801717EB2}" type="datetimeFigureOut">
               <a:rPr lang="en-AU" smtClean="0"/>
-              <a:t>16/08/2024</a:t>
+              <a:t>21/08/2024</a:t>
             </a:fld>
             <a:endParaRPr lang="en-AU"/>
           </a:p>
@@ -5839,7 +5839,7 @@
           <a:p>
             <a:fld id="{EDEC158B-FB0A-43FC-87BA-79B801717EB2}" type="datetimeFigureOut">
               <a:rPr lang="en-AU" smtClean="0"/>
-              <a:t>16/08/2024</a:t>
+              <a:t>21/08/2024</a:t>
             </a:fld>
             <a:endParaRPr lang="en-AU"/>
           </a:p>
@@ -5981,7 +5981,7 @@
           <a:p>
             <a:fld id="{EDEC158B-FB0A-43FC-87BA-79B801717EB2}" type="datetimeFigureOut">
               <a:rPr lang="en-AU" smtClean="0"/>
-              <a:t>16/08/2024</a:t>
+              <a:t>21/08/2024</a:t>
             </a:fld>
             <a:endParaRPr lang="en-AU"/>
           </a:p>
@@ -6094,7 +6094,7 @@
           <a:p>
             <a:fld id="{EDEC158B-FB0A-43FC-87BA-79B801717EB2}" type="datetimeFigureOut">
               <a:rPr lang="en-AU" smtClean="0"/>
-              <a:t>16/08/2024</a:t>
+              <a:t>21/08/2024</a:t>
             </a:fld>
             <a:endParaRPr lang="en-AU"/>
           </a:p>
@@ -6407,7 +6407,7 @@
           <a:p>
             <a:fld id="{EDEC158B-FB0A-43FC-87BA-79B801717EB2}" type="datetimeFigureOut">
               <a:rPr lang="en-AU" smtClean="0"/>
-              <a:t>16/08/2024</a:t>
+              <a:t>21/08/2024</a:t>
             </a:fld>
             <a:endParaRPr lang="en-AU"/>
           </a:p>
@@ -6696,7 +6696,7 @@
           <a:p>
             <a:fld id="{EDEC158B-FB0A-43FC-87BA-79B801717EB2}" type="datetimeFigureOut">
               <a:rPr lang="en-AU" smtClean="0"/>
-              <a:t>16/08/2024</a:t>
+              <a:t>21/08/2024</a:t>
             </a:fld>
             <a:endParaRPr lang="en-AU"/>
           </a:p>
@@ -6939,7 +6939,7 @@
           <a:p>
             <a:fld id="{EDEC158B-FB0A-43FC-87BA-79B801717EB2}" type="datetimeFigureOut">
               <a:rPr lang="en-AU" smtClean="0"/>
-              <a:t>16/08/2024</a:t>
+              <a:t>21/08/2024</a:t>
             </a:fld>
             <a:endParaRPr lang="en-AU"/>
           </a:p>
@@ -9503,7 +9503,7 @@
                 <a:effectLst/>
                 <a:latin typeface="Open Sans" panose="020B0606030504020204" pitchFamily="34" charset="0"/>
               </a:rPr>
-              <a:t>Conclusion and future </a:t>
+              <a:t>Conclusion, future </a:t>
             </a:r>
             <a:r>
               <a:rPr lang="en-GB" dirty="0">
@@ -9522,44 +9522,9 @@
                 <a:effectLst/>
                 <a:latin typeface="Open Sans" panose="020B0606030504020204" pitchFamily="34" charset="0"/>
               </a:rPr>
-              <a:t>utlook</a:t>
+              <a:t>utlook and Q&amp;A</a:t>
             </a:r>
             <a:endParaRPr lang="en-GB" dirty="0"/>
-          </a:p>
-        </p:txBody>
-      </p:sp>
-      <p:sp>
-        <p:nvSpPr>
-          <p:cNvPr id="69" name="TextBox 68">
-            <a:extLst>
-              <a:ext uri="{FF2B5EF4-FFF2-40B4-BE49-F238E27FC236}">
-                <a16:creationId xmlns:a16="http://schemas.microsoft.com/office/drawing/2014/main" id="{8A9161EC-CE4E-8092-12CD-9101EE34DBF0}"/>
-              </a:ext>
-            </a:extLst>
-          </p:cNvPr>
-          <p:cNvSpPr txBox="1"/>
-          <p:nvPr/>
-        </p:nvSpPr>
-        <p:spPr>
-          <a:xfrm>
-            <a:off x="5804569" y="5815512"/>
-            <a:ext cx="940311" cy="369332"/>
-          </a:xfrm>
-          <a:prstGeom prst="rect">
-            <a:avLst/>
-          </a:prstGeom>
-          <a:noFill/>
-        </p:spPr>
-        <p:txBody>
-          <a:bodyPr wrap="square">
-            <a:spAutoFit/>
-          </a:bodyPr>
-          <a:lstStyle/>
-          <a:p>
-            <a:r>
-              <a:rPr lang="en-GB" dirty="0"/>
-              <a:t>Q&amp;A</a:t>
-            </a:r>
           </a:p>
         </p:txBody>
       </p:sp>
@@ -9688,52 +9653,6 @@
           </a:prstGeom>
         </p:spPr>
       </p:pic>
-      <p:sp>
-        <p:nvSpPr>
-          <p:cNvPr id="74" name="TextBox 73">
-            <a:extLst>
-              <a:ext uri="{FF2B5EF4-FFF2-40B4-BE49-F238E27FC236}">
-                <a16:creationId xmlns:a16="http://schemas.microsoft.com/office/drawing/2014/main" id="{E92DBCFE-95EE-2599-32A4-F08BF400398B}"/>
-              </a:ext>
-            </a:extLst>
-          </p:cNvPr>
-          <p:cNvSpPr txBox="1"/>
-          <p:nvPr/>
-        </p:nvSpPr>
-        <p:spPr>
-          <a:xfrm>
-            <a:off x="5472513" y="6215665"/>
-            <a:ext cx="1604421" cy="369332"/>
-          </a:xfrm>
-          <a:prstGeom prst="rect">
-            <a:avLst/>
-          </a:prstGeom>
-          <a:noFill/>
-          <a:ln>
-            <a:solidFill>
-              <a:schemeClr val="tx1"/>
-            </a:solidFill>
-          </a:ln>
-        </p:spPr>
-        <p:txBody>
-          <a:bodyPr wrap="square">
-            <a:spAutoFit/>
-          </a:bodyPr>
-          <a:lstStyle/>
-          <a:p>
-            <a:r>
-              <a:rPr lang="en-GB" dirty="0">
-                <a:solidFill>
-                  <a:srgbClr val="606C71"/>
-                </a:solidFill>
-                <a:latin typeface="Open Sans" panose="020B0606030504020204" pitchFamily="34" charset="0"/>
-              </a:rPr>
-              <a:t>Finish 16:00</a:t>
-            </a:r>
-            <a:endParaRPr lang="en-GB" dirty="0"/>
-          </a:p>
-        </p:txBody>
-      </p:sp>
     </p:spTree>
     <p:extLst>
       <p:ext uri="{BB962C8B-B14F-4D97-AF65-F5344CB8AC3E}">
@@ -12423,8 +12342,8 @@
         </p:blipFill>
         <p:spPr>
           <a:xfrm>
-            <a:off x="7824246" y="-248856"/>
-            <a:ext cx="4506787" cy="2402694"/>
+            <a:off x="8637187" y="-18569"/>
+            <a:ext cx="3564190" cy="1900169"/>
           </a:xfrm>
           <a:prstGeom prst="rect">
             <a:avLst/>
@@ -15971,33 +15890,15 @@
                                   </p:childTnLst>
                                 </p:cTn>
                               </p:par>
-                            </p:childTnLst>
-                          </p:cTn>
-                        </p:par>
-                      </p:childTnLst>
-                    </p:cTn>
-                  </p:par>
-                  <p:par>
-                    <p:cTn id="15" fill="hold">
-                      <p:stCondLst>
-                        <p:cond delay="indefinite"/>
-                      </p:stCondLst>
-                      <p:childTnLst>
-                        <p:par>
-                          <p:cTn id="16" fill="hold">
-                            <p:stCondLst>
-                              <p:cond delay="0"/>
-                            </p:stCondLst>
-                            <p:childTnLst>
                               <p:par>
-                                <p:cTn id="17" presetID="1" presetClass="entr" presetSubtype="0" fill="hold" nodeType="clickEffect">
+                                <p:cTn id="15" presetID="1" presetClass="entr" presetSubtype="0" fill="hold" nodeType="withEffect">
                                   <p:stCondLst>
                                     <p:cond delay="0"/>
                                   </p:stCondLst>
                                   <p:childTnLst>
                                     <p:set>
                                       <p:cBhvr>
-                                        <p:cTn id="18" dur="1" fill="hold">
+                                        <p:cTn id="16" dur="1" fill="hold">
                                           <p:stCondLst>
                                             <p:cond delay="0"/>
                                           </p:stCondLst>
@@ -16023,26 +15924,26 @@
                     </p:cTn>
                   </p:par>
                   <p:par>
-                    <p:cTn id="19" fill="hold">
+                    <p:cTn id="17" fill="hold">
                       <p:stCondLst>
                         <p:cond delay="indefinite"/>
                       </p:stCondLst>
                       <p:childTnLst>
                         <p:par>
-                          <p:cTn id="20" fill="hold">
+                          <p:cTn id="18" fill="hold">
                             <p:stCondLst>
                               <p:cond delay="0"/>
                             </p:stCondLst>
                             <p:childTnLst>
                               <p:par>
-                                <p:cTn id="21" presetID="1" presetClass="entr" presetSubtype="0" fill="hold" grpId="0" nodeType="clickEffect">
+                                <p:cTn id="19" presetID="1" presetClass="entr" presetSubtype="0" fill="hold" grpId="0" nodeType="clickEffect">
                                   <p:stCondLst>
                                     <p:cond delay="0"/>
                                   </p:stCondLst>
                                   <p:childTnLst>
                                     <p:set>
                                       <p:cBhvr>
-                                        <p:cTn id="22" dur="1" fill="hold">
+                                        <p:cTn id="20" dur="1" fill="hold">
                                           <p:stCondLst>
                                             <p:cond delay="0"/>
                                           </p:stCondLst>
@@ -16062,14 +15963,14 @@
                                 </p:cTn>
                               </p:par>
                               <p:par>
-                                <p:cTn id="23" presetID="1" presetClass="entr" presetSubtype="0" fill="hold" nodeType="withEffect">
+                                <p:cTn id="21" presetID="1" presetClass="entr" presetSubtype="0" fill="hold" nodeType="withEffect">
                                   <p:stCondLst>
                                     <p:cond delay="0"/>
                                   </p:stCondLst>
                                   <p:childTnLst>
                                     <p:set>
                                       <p:cBhvr>
-                                        <p:cTn id="24" dur="1" fill="hold">
+                                        <p:cTn id="22" dur="1" fill="hold">
                                           <p:stCondLst>
                                             <p:cond delay="0"/>
                                           </p:stCondLst>
@@ -16089,14 +15990,14 @@
                                 </p:cTn>
                               </p:par>
                               <p:par>
-                                <p:cTn id="25" presetID="1" presetClass="entr" presetSubtype="0" fill="hold" grpId="0" nodeType="withEffect">
+                                <p:cTn id="23" presetID="1" presetClass="entr" presetSubtype="0" fill="hold" grpId="0" nodeType="withEffect">
                                   <p:stCondLst>
                                     <p:cond delay="0"/>
                                   </p:stCondLst>
                                   <p:childTnLst>
                                     <p:set>
                                       <p:cBhvr>
-                                        <p:cTn id="26" dur="1" fill="hold">
+                                        <p:cTn id="24" dur="1" fill="hold">
                                           <p:stCondLst>
                                             <p:cond delay="0"/>
                                           </p:stCondLst>
@@ -16116,7 +16017,34 @@
                                 </p:cTn>
                               </p:par>
                               <p:par>
-                                <p:cTn id="27" presetID="1" presetClass="entr" presetSubtype="0" fill="hold" nodeType="withEffect">
+                                <p:cTn id="25" presetID="1" presetClass="entr" presetSubtype="0" fill="hold" nodeType="withEffect">
+                                  <p:stCondLst>
+                                    <p:cond delay="0"/>
+                                  </p:stCondLst>
+                                  <p:childTnLst>
+                                    <p:set>
+                                      <p:cBhvr>
+                                        <p:cTn id="26" dur="1" fill="hold">
+                                          <p:stCondLst>
+                                            <p:cond delay="0"/>
+                                          </p:stCondLst>
+                                        </p:cTn>
+                                        <p:tgtEl>
+                                          <p:spTgt spid="12"/>
+                                        </p:tgtEl>
+                                        <p:attrNameLst>
+                                          <p:attrName>style.visibility</p:attrName>
+                                        </p:attrNameLst>
+                                      </p:cBhvr>
+                                      <p:to>
+                                        <p:strVal val="visible"/>
+                                      </p:to>
+                                    </p:set>
+                                  </p:childTnLst>
+                                </p:cTn>
+                              </p:par>
+                              <p:par>
+                                <p:cTn id="27" presetID="1" presetClass="entr" presetSubtype="0" fill="hold" grpId="0" nodeType="withEffect">
                                   <p:stCondLst>
                                     <p:cond delay="0"/>
                                   </p:stCondLst>
@@ -16129,7 +16057,7 @@
                                           </p:stCondLst>
                                         </p:cTn>
                                         <p:tgtEl>
-                                          <p:spTgt spid="12"/>
+                                          <p:spTgt spid="16"/>
                                         </p:tgtEl>
                                         <p:attrNameLst>
                                           <p:attrName>style.visibility</p:attrName>
@@ -16156,51 +16084,6 @@
                                           </p:stCondLst>
                                         </p:cTn>
                                         <p:tgtEl>
-                                          <p:spTgt spid="16"/>
-                                        </p:tgtEl>
-                                        <p:attrNameLst>
-                                          <p:attrName>style.visibility</p:attrName>
-                                        </p:attrNameLst>
-                                      </p:cBhvr>
-                                      <p:to>
-                                        <p:strVal val="visible"/>
-                                      </p:to>
-                                    </p:set>
-                                  </p:childTnLst>
-                                </p:cTn>
-                              </p:par>
-                            </p:childTnLst>
-                          </p:cTn>
-                        </p:par>
-                      </p:childTnLst>
-                    </p:cTn>
-                  </p:par>
-                  <p:par>
-                    <p:cTn id="31" fill="hold">
-                      <p:stCondLst>
-                        <p:cond delay="indefinite"/>
-                      </p:stCondLst>
-                      <p:childTnLst>
-                        <p:par>
-                          <p:cTn id="32" fill="hold">
-                            <p:stCondLst>
-                              <p:cond delay="0"/>
-                            </p:stCondLst>
-                            <p:childTnLst>
-                              <p:par>
-                                <p:cTn id="33" presetID="1" presetClass="entr" presetSubtype="0" fill="hold" grpId="0" nodeType="clickEffect">
-                                  <p:stCondLst>
-                                    <p:cond delay="0"/>
-                                  </p:stCondLst>
-                                  <p:childTnLst>
-                                    <p:set>
-                                      <p:cBhvr>
-                                        <p:cTn id="34" dur="1" fill="hold">
-                                          <p:stCondLst>
-                                            <p:cond delay="0"/>
-                                          </p:stCondLst>
-                                        </p:cTn>
-                                        <p:tgtEl>
                                           <p:spTgt spid="5"/>
                                         </p:tgtEl>
                                         <p:attrNameLst>
@@ -16215,7 +16098,61 @@
                                 </p:cTn>
                               </p:par>
                               <p:par>
-                                <p:cTn id="35" presetID="1" presetClass="entr" presetSubtype="0" fill="hold" nodeType="withEffect">
+                                <p:cTn id="31" presetID="1" presetClass="entr" presetSubtype="0" fill="hold" nodeType="withEffect">
+                                  <p:stCondLst>
+                                    <p:cond delay="0"/>
+                                  </p:stCondLst>
+                                  <p:childTnLst>
+                                    <p:set>
+                                      <p:cBhvr>
+                                        <p:cTn id="32" dur="1" fill="hold">
+                                          <p:stCondLst>
+                                            <p:cond delay="0"/>
+                                          </p:stCondLst>
+                                        </p:cTn>
+                                        <p:tgtEl>
+                                          <p:spTgt spid="17"/>
+                                        </p:tgtEl>
+                                        <p:attrNameLst>
+                                          <p:attrName>style.visibility</p:attrName>
+                                        </p:attrNameLst>
+                                      </p:cBhvr>
+                                      <p:to>
+                                        <p:strVal val="visible"/>
+                                      </p:to>
+                                    </p:set>
+                                  </p:childTnLst>
+                                </p:cTn>
+                              </p:par>
+                              <p:par>
+                                <p:cTn id="33" presetID="1" presetClass="entr" presetSubtype="0" fill="hold" grpId="0" nodeType="withEffect">
+                                  <p:stCondLst>
+                                    <p:cond delay="0"/>
+                                  </p:stCondLst>
+                                  <p:childTnLst>
+                                    <p:set>
+                                      <p:cBhvr>
+                                        <p:cTn id="34" dur="1" fill="hold">
+                                          <p:stCondLst>
+                                            <p:cond delay="0"/>
+                                          </p:stCondLst>
+                                        </p:cTn>
+                                        <p:tgtEl>
+                                          <p:spTgt spid="14"/>
+                                        </p:tgtEl>
+                                        <p:attrNameLst>
+                                          <p:attrName>style.visibility</p:attrName>
+                                        </p:attrNameLst>
+                                      </p:cBhvr>
+                                      <p:to>
+                                        <p:strVal val="visible"/>
+                                      </p:to>
+                                    </p:set>
+                                  </p:childTnLst>
+                                </p:cTn>
+                              </p:par>
+                              <p:par>
+                                <p:cTn id="35" presetID="1" presetClass="entr" presetSubtype="0" fill="hold" grpId="0" nodeType="withEffect">
                                   <p:stCondLst>
                                     <p:cond delay="0"/>
                                   </p:stCondLst>
@@ -16228,7 +16165,7 @@
                                           </p:stCondLst>
                                         </p:cTn>
                                         <p:tgtEl>
-                                          <p:spTgt spid="17"/>
+                                          <p:spTgt spid="15"/>
                                         </p:tgtEl>
                                         <p:attrNameLst>
                                           <p:attrName>style.visibility</p:attrName>
@@ -16255,7 +16192,7 @@
                                           </p:stCondLst>
                                         </p:cTn>
                                         <p:tgtEl>
-                                          <p:spTgt spid="14"/>
+                                          <p:spTgt spid="18"/>
                                         </p:tgtEl>
                                         <p:attrNameLst>
                                           <p:attrName>style.visibility</p:attrName>
@@ -16282,60 +16219,6 @@
                                           </p:stCondLst>
                                         </p:cTn>
                                         <p:tgtEl>
-                                          <p:spTgt spid="15"/>
-                                        </p:tgtEl>
-                                        <p:attrNameLst>
-                                          <p:attrName>style.visibility</p:attrName>
-                                        </p:attrNameLst>
-                                      </p:cBhvr>
-                                      <p:to>
-                                        <p:strVal val="visible"/>
-                                      </p:to>
-                                    </p:set>
-                                  </p:childTnLst>
-                                </p:cTn>
-                              </p:par>
-                              <p:par>
-                                <p:cTn id="41" presetID="1" presetClass="entr" presetSubtype="0" fill="hold" grpId="0" nodeType="withEffect">
-                                  <p:stCondLst>
-                                    <p:cond delay="0"/>
-                                  </p:stCondLst>
-                                  <p:childTnLst>
-                                    <p:set>
-                                      <p:cBhvr>
-                                        <p:cTn id="42" dur="1" fill="hold">
-                                          <p:stCondLst>
-                                            <p:cond delay="0"/>
-                                          </p:stCondLst>
-                                        </p:cTn>
-                                        <p:tgtEl>
-                                          <p:spTgt spid="18"/>
-                                        </p:tgtEl>
-                                        <p:attrNameLst>
-                                          <p:attrName>style.visibility</p:attrName>
-                                        </p:attrNameLst>
-                                      </p:cBhvr>
-                                      <p:to>
-                                        <p:strVal val="visible"/>
-                                      </p:to>
-                                    </p:set>
-                                  </p:childTnLst>
-                                </p:cTn>
-                              </p:par>
-                              <p:par>
-                                <p:cTn id="43" presetID="1" presetClass="entr" presetSubtype="0" fill="hold" grpId="0" nodeType="withEffect">
-                                  <p:stCondLst>
-                                    <p:cond delay="0"/>
-                                  </p:stCondLst>
-                                  <p:childTnLst>
-                                    <p:set>
-                                      <p:cBhvr>
-                                        <p:cTn id="44" dur="1" fill="hold">
-                                          <p:stCondLst>
-                                            <p:cond delay="0"/>
-                                          </p:stCondLst>
-                                        </p:cTn>
-                                        <p:tgtEl>
                                           <p:spTgt spid="26"/>
                                         </p:tgtEl>
                                         <p:attrNameLst>
@@ -16356,26 +16239,26 @@
                     </p:cTn>
                   </p:par>
                   <p:par>
-                    <p:cTn id="45" fill="hold">
+                    <p:cTn id="41" fill="hold">
                       <p:stCondLst>
                         <p:cond delay="indefinite"/>
                       </p:stCondLst>
                       <p:childTnLst>
                         <p:par>
-                          <p:cTn id="46" fill="hold">
+                          <p:cTn id="42" fill="hold">
                             <p:stCondLst>
                               <p:cond delay="0"/>
                             </p:stCondLst>
                             <p:childTnLst>
                               <p:par>
-                                <p:cTn id="47" presetID="1" presetClass="entr" presetSubtype="0" fill="hold" grpId="0" nodeType="clickEffect">
+                                <p:cTn id="43" presetID="1" presetClass="entr" presetSubtype="0" fill="hold" grpId="0" nodeType="clickEffect">
                                   <p:stCondLst>
                                     <p:cond delay="0"/>
                                   </p:stCondLst>
                                   <p:childTnLst>
                                     <p:set>
                                       <p:cBhvr>
-                                        <p:cTn id="48" dur="1" fill="hold">
+                                        <p:cTn id="44" dur="1" fill="hold">
                                           <p:stCondLst>
                                             <p:cond delay="0"/>
                                           </p:stCondLst>
@@ -16395,14 +16278,14 @@
                                 </p:cTn>
                               </p:par>
                               <p:par>
-                                <p:cTn id="49" presetID="1" presetClass="entr" presetSubtype="0" fill="hold" grpId="0" nodeType="withEffect">
+                                <p:cTn id="45" presetID="1" presetClass="entr" presetSubtype="0" fill="hold" grpId="0" nodeType="withEffect">
                                   <p:stCondLst>
                                     <p:cond delay="0"/>
                                   </p:stCondLst>
                                   <p:childTnLst>
                                     <p:set>
                                       <p:cBhvr>
-                                        <p:cTn id="50" dur="1" fill="hold">
+                                        <p:cTn id="46" dur="1" fill="hold">
                                           <p:stCondLst>
                                             <p:cond delay="0"/>
                                           </p:stCondLst>
@@ -16422,14 +16305,14 @@
                                 </p:cTn>
                               </p:par>
                               <p:par>
-                                <p:cTn id="51" presetID="1" presetClass="entr" presetSubtype="0" fill="hold" grpId="0" nodeType="withEffect">
+                                <p:cTn id="47" presetID="1" presetClass="entr" presetSubtype="0" fill="hold" grpId="0" nodeType="withEffect">
                                   <p:stCondLst>
                                     <p:cond delay="0"/>
                                   </p:stCondLst>
                                   <p:childTnLst>
                                     <p:set>
                                       <p:cBhvr>
-                                        <p:cTn id="52" dur="1" fill="hold">
+                                        <p:cTn id="48" dur="1" fill="hold">
                                           <p:stCondLst>
                                             <p:cond delay="0"/>
                                           </p:stCondLst>
@@ -16449,14 +16332,14 @@
                                 </p:cTn>
                               </p:par>
                               <p:par>
-                                <p:cTn id="53" presetID="1" presetClass="entr" presetSubtype="0" fill="hold" nodeType="withEffect">
+                                <p:cTn id="49" presetID="1" presetClass="entr" presetSubtype="0" fill="hold" nodeType="withEffect">
                                   <p:stCondLst>
                                     <p:cond delay="0"/>
                                   </p:stCondLst>
                                   <p:childTnLst>
                                     <p:set>
                                       <p:cBhvr>
-                                        <p:cTn id="54" dur="1" fill="hold">
+                                        <p:cTn id="50" dur="1" fill="hold">
                                           <p:stCondLst>
                                             <p:cond delay="0"/>
                                           </p:stCondLst>
@@ -16482,26 +16365,26 @@
                     </p:cTn>
                   </p:par>
                   <p:par>
-                    <p:cTn id="55" fill="hold">
+                    <p:cTn id="51" fill="hold">
                       <p:stCondLst>
                         <p:cond delay="indefinite"/>
                       </p:stCondLst>
                       <p:childTnLst>
                         <p:par>
-                          <p:cTn id="56" fill="hold">
+                          <p:cTn id="52" fill="hold">
                             <p:stCondLst>
                               <p:cond delay="0"/>
                             </p:stCondLst>
                             <p:childTnLst>
                               <p:par>
-                                <p:cTn id="57" presetID="1" presetClass="entr" presetSubtype="0" fill="hold" grpId="0" nodeType="clickEffect">
+                                <p:cTn id="53" presetID="1" presetClass="entr" presetSubtype="0" fill="hold" grpId="0" nodeType="clickEffect">
                                   <p:stCondLst>
                                     <p:cond delay="0"/>
                                   </p:stCondLst>
                                   <p:childTnLst>
                                     <p:set>
                                       <p:cBhvr>
-                                        <p:cTn id="58" dur="1" fill="hold">
+                                        <p:cTn id="54" dur="1" fill="hold">
                                           <p:stCondLst>
                                             <p:cond delay="0"/>
                                           </p:stCondLst>
@@ -16521,14 +16404,14 @@
                                 </p:cTn>
                               </p:par>
                               <p:par>
-                                <p:cTn id="59" presetID="1" presetClass="entr" presetSubtype="0" fill="hold" nodeType="withEffect">
+                                <p:cTn id="55" presetID="1" presetClass="entr" presetSubtype="0" fill="hold" nodeType="withEffect">
                                   <p:stCondLst>
                                     <p:cond delay="0"/>
                                   </p:stCondLst>
                                   <p:childTnLst>
                                     <p:set>
                                       <p:cBhvr>
-                                        <p:cTn id="60" dur="1" fill="hold">
+                                        <p:cTn id="56" dur="1" fill="hold">
                                           <p:stCondLst>
                                             <p:cond delay="0"/>
                                           </p:stCondLst>
@@ -18207,8 +18090,8 @@
         </p:blipFill>
         <p:spPr>
           <a:xfrm>
-            <a:off x="4712784" y="3621208"/>
-            <a:ext cx="6376541" cy="564481"/>
+            <a:off x="4809997" y="3631670"/>
+            <a:ext cx="4922829" cy="435792"/>
           </a:xfrm>
           <a:prstGeom prst="rect">
             <a:avLst/>
@@ -20551,7 +20434,7 @@
         </p:nvSpPr>
         <p:spPr>
           <a:xfrm>
-            <a:off x="466629" y="1402622"/>
+            <a:off x="542057" y="1032422"/>
             <a:ext cx="11107885" cy="517798"/>
           </a:xfrm>
           <a:prstGeom prst="rect">
@@ -20606,7 +20489,7 @@
         </p:nvSpPr>
         <p:spPr>
           <a:xfrm>
-            <a:off x="308835" y="1920420"/>
+            <a:off x="384263" y="1550220"/>
             <a:ext cx="11107885" cy="987937"/>
           </a:xfrm>
           <a:prstGeom prst="rect">
@@ -20673,7 +20556,7 @@
         </p:nvSpPr>
         <p:spPr>
           <a:xfrm>
-            <a:off x="240144" y="2955789"/>
+            <a:off x="315572" y="2585589"/>
             <a:ext cx="11674765" cy="369332"/>
           </a:xfrm>
           <a:prstGeom prst="rect">
@@ -20691,7 +20574,7 @@
               <a:rPr lang="en-GB" dirty="0">
                 <a:hlinkClick r:id="rId3"/>
               </a:rPr>
-              <a:t>https://github.com/aeon-toolkit/aeon-tutorials/blob/main/KDD-2024/Notebooks/part1_Introduction.ipynb</a:t>
+              <a:t>https://github.com/aeon-toolkit/aeon-tutorials/blob/main/KDD-2024/Notebooks/part1_introduction.ipynb</a:t>
             </a:r>
             <a:endParaRPr lang="en-GB" dirty="0"/>
           </a:p>
@@ -21617,6 +21500,91 @@
               <a:effectLst/>
               <a:latin typeface="Arial" panose="020B0604020202020204" pitchFamily="34" charset="0"/>
             </a:endParaRPr>
+          </a:p>
+        </p:txBody>
+      </p:sp>
+      <p:pic>
+        <p:nvPicPr>
+          <p:cNvPr id="8" name="Picture 7">
+            <a:extLst>
+              <a:ext uri="{FF2B5EF4-FFF2-40B4-BE49-F238E27FC236}">
+                <a16:creationId xmlns:a16="http://schemas.microsoft.com/office/drawing/2014/main" id="{1133383E-C77E-AB65-5A09-EAB0E1E03E83}"/>
+              </a:ext>
+            </a:extLst>
+          </p:cNvPr>
+          <p:cNvPicPr>
+            <a:picLocks noChangeAspect="1"/>
+          </p:cNvPicPr>
+          <p:nvPr/>
+        </p:nvPicPr>
+        <p:blipFill>
+          <a:blip r:embed="rId4"/>
+          <a:stretch>
+            <a:fillRect/>
+          </a:stretch>
+        </p:blipFill>
+        <p:spPr>
+          <a:xfrm>
+            <a:off x="8805723" y="3790624"/>
+            <a:ext cx="2686425" cy="2724530"/>
+          </a:xfrm>
+          <a:prstGeom prst="rect">
+            <a:avLst/>
+          </a:prstGeom>
+        </p:spPr>
+      </p:pic>
+      <p:sp>
+        <p:nvSpPr>
+          <p:cNvPr id="6" name="Title 1">
+            <a:extLst>
+              <a:ext uri="{FF2B5EF4-FFF2-40B4-BE49-F238E27FC236}">
+                <a16:creationId xmlns:a16="http://schemas.microsoft.com/office/drawing/2014/main" id="{CCFA3569-C4FE-481F-F043-AD4E3F76E2B3}"/>
+              </a:ext>
+            </a:extLst>
+          </p:cNvPr>
+          <p:cNvSpPr txBox="1">
+            <a:spLocks/>
+          </p:cNvSpPr>
+          <p:nvPr/>
+        </p:nvSpPr>
+        <p:spPr>
+          <a:xfrm>
+            <a:off x="-219942" y="3002353"/>
+            <a:ext cx="11107885" cy="517798"/>
+          </a:xfrm>
+          <a:prstGeom prst="rect">
+            <a:avLst/>
+          </a:prstGeom>
+        </p:spPr>
+        <p:txBody>
+          <a:bodyPr vert="horz" lIns="91440" tIns="45720" rIns="91440" bIns="45720" rtlCol="0" anchor="b">
+            <a:normAutofit/>
+          </a:bodyPr>
+          <a:lstStyle>
+            <a:lvl1pPr algn="ctr" defTabSz="914400" rtl="0" eaLnBrk="1" latinLnBrk="0" hangingPunct="1">
+              <a:lnSpc>
+                <a:spcPct val="90000"/>
+              </a:lnSpc>
+              <a:spcBef>
+                <a:spcPct val="0"/>
+              </a:spcBef>
+              <a:buNone/>
+              <a:defRPr sz="6000" kern="1200">
+                <a:solidFill>
+                  <a:schemeClr val="tx1"/>
+                </a:solidFill>
+                <a:latin typeface="+mj-lt"/>
+                <a:ea typeface="+mj-ea"/>
+                <a:cs typeface="+mj-cs"/>
+              </a:defRPr>
+            </a:lvl1pPr>
+          </a:lstStyle>
+          <a:p>
+            <a:r>
+              <a:rPr lang="en-US" sz="3000" dirty="0"/>
+              <a:t>Join our slack if you want to chat about any element of the code</a:t>
+            </a:r>
+            <a:endParaRPr lang="en-AU" sz="3000" dirty="0"/>
           </a:p>
         </p:txBody>
       </p:sp>

</xml_diff>